<commit_message>
New plotly version + download example file
</commit_message>
<xml_diff>
--- a/REDACTION/FIGURE/Figure1.pptx
+++ b/REDACTION/FIGURE/Figure1.pptx
@@ -288,7 +288,7 @@
           <a:p>
             <a:fld id="{DAD338C0-28AA-6D41-A9B2-085AF9BF4D7C}" type="datetimeFigureOut">
               <a:rPr lang="fr-FR" smtClean="0"/>
-              <a:t>22/08/16</a:t>
+              <a:t>30/08/16</a:t>
             </a:fld>
             <a:endParaRPr lang="fr-FR"/>
           </a:p>
@@ -458,7 +458,7 @@
           <a:p>
             <a:fld id="{DAD338C0-28AA-6D41-A9B2-085AF9BF4D7C}" type="datetimeFigureOut">
               <a:rPr lang="fr-FR" smtClean="0"/>
-              <a:t>22/08/16</a:t>
+              <a:t>30/08/16</a:t>
             </a:fld>
             <a:endParaRPr lang="fr-FR"/>
           </a:p>
@@ -638,7 +638,7 @@
           <a:p>
             <a:fld id="{DAD338C0-28AA-6D41-A9B2-085AF9BF4D7C}" type="datetimeFigureOut">
               <a:rPr lang="fr-FR" smtClean="0"/>
-              <a:t>22/08/16</a:t>
+              <a:t>30/08/16</a:t>
             </a:fld>
             <a:endParaRPr lang="fr-FR"/>
           </a:p>
@@ -808,7 +808,7 @@
           <a:p>
             <a:fld id="{DAD338C0-28AA-6D41-A9B2-085AF9BF4D7C}" type="datetimeFigureOut">
               <a:rPr lang="fr-FR" smtClean="0"/>
-              <a:t>22/08/16</a:t>
+              <a:t>30/08/16</a:t>
             </a:fld>
             <a:endParaRPr lang="fr-FR"/>
           </a:p>
@@ -1054,7 +1054,7 @@
           <a:p>
             <a:fld id="{DAD338C0-28AA-6D41-A9B2-085AF9BF4D7C}" type="datetimeFigureOut">
               <a:rPr lang="fr-FR" smtClean="0"/>
-              <a:t>22/08/16</a:t>
+              <a:t>30/08/16</a:t>
             </a:fld>
             <a:endParaRPr lang="fr-FR"/>
           </a:p>
@@ -1342,7 +1342,7 @@
           <a:p>
             <a:fld id="{DAD338C0-28AA-6D41-A9B2-085AF9BF4D7C}" type="datetimeFigureOut">
               <a:rPr lang="fr-FR" smtClean="0"/>
-              <a:t>22/08/16</a:t>
+              <a:t>30/08/16</a:t>
             </a:fld>
             <a:endParaRPr lang="fr-FR"/>
           </a:p>
@@ -1764,7 +1764,7 @@
           <a:p>
             <a:fld id="{DAD338C0-28AA-6D41-A9B2-085AF9BF4D7C}" type="datetimeFigureOut">
               <a:rPr lang="fr-FR" smtClean="0"/>
-              <a:t>22/08/16</a:t>
+              <a:t>30/08/16</a:t>
             </a:fld>
             <a:endParaRPr lang="fr-FR"/>
           </a:p>
@@ -1882,7 +1882,7 @@
           <a:p>
             <a:fld id="{DAD338C0-28AA-6D41-A9B2-085AF9BF4D7C}" type="datetimeFigureOut">
               <a:rPr lang="fr-FR" smtClean="0"/>
-              <a:t>22/08/16</a:t>
+              <a:t>30/08/16</a:t>
             </a:fld>
             <a:endParaRPr lang="fr-FR"/>
           </a:p>
@@ -1977,7 +1977,7 @@
           <a:p>
             <a:fld id="{DAD338C0-28AA-6D41-A9B2-085AF9BF4D7C}" type="datetimeFigureOut">
               <a:rPr lang="fr-FR" smtClean="0"/>
-              <a:t>22/08/16</a:t>
+              <a:t>30/08/16</a:t>
             </a:fld>
             <a:endParaRPr lang="fr-FR"/>
           </a:p>
@@ -2254,7 +2254,7 @@
           <a:p>
             <a:fld id="{DAD338C0-28AA-6D41-A9B2-085AF9BF4D7C}" type="datetimeFigureOut">
               <a:rPr lang="fr-FR" smtClean="0"/>
-              <a:t>22/08/16</a:t>
+              <a:t>30/08/16</a:t>
             </a:fld>
             <a:endParaRPr lang="fr-FR"/>
           </a:p>
@@ -2507,7 +2507,7 @@
           <a:p>
             <a:fld id="{DAD338C0-28AA-6D41-A9B2-085AF9BF4D7C}" type="datetimeFigureOut">
               <a:rPr lang="fr-FR" smtClean="0"/>
-              <a:t>22/08/16</a:t>
+              <a:t>30/08/16</a:t>
             </a:fld>
             <a:endParaRPr lang="fr-FR"/>
           </a:p>
@@ -2720,7 +2720,7 @@
           <a:p>
             <a:fld id="{DAD338C0-28AA-6D41-A9B2-085AF9BF4D7C}" type="datetimeFigureOut">
               <a:rPr lang="fr-FR" smtClean="0"/>
-              <a:t>22/08/16</a:t>
+              <a:t>30/08/16</a:t>
             </a:fld>
             <a:endParaRPr lang="fr-FR"/>
           </a:p>
@@ -3281,6 +3281,30 @@
           </a:ln>
         </p:spPr>
       </p:pic>
+      <p:pic>
+        <p:nvPicPr>
+          <p:cNvPr id="3" name="Image 2"/>
+          <p:cNvPicPr>
+            <a:picLocks noChangeAspect="1"/>
+          </p:cNvPicPr>
+          <p:nvPr/>
+        </p:nvPicPr>
+        <p:blipFill>
+          <a:blip r:embed="rId8"/>
+          <a:stretch>
+            <a:fillRect/>
+          </a:stretch>
+        </p:blipFill>
+        <p:spPr>
+          <a:xfrm>
+            <a:off x="6473135" y="3536069"/>
+            <a:ext cx="1375465" cy="242140"/>
+          </a:xfrm>
+          <a:prstGeom prst="rect">
+            <a:avLst/>
+          </a:prstGeom>
+        </p:spPr>
+      </p:pic>
     </p:spTree>
     <p:extLst>
       <p:ext uri="{BB962C8B-B14F-4D97-AF65-F5344CB8AC3E}">

</xml_diff>